<commit_message>
add new figures to paper
</commit_message>
<xml_diff>
--- a/papers/CACMmicrobit/images/figures.pptx
+++ b/papers/CACMmicrobit/images/figures.pptx
@@ -6,6 +6,7 @@
   </p:sldMasterIdLst>
   <p:sldIdLst>
     <p:sldId id="257" r:id="rId2"/>
+    <p:sldId id="258" r:id="rId3"/>
   </p:sldIdLst>
   <p:sldSz cx="12192000" cy="6858000"/>
   <p:notesSz cx="6858000" cy="9144000"/>
@@ -104,6 +105,27 @@
       </a:defRPr>
     </a:lvl9pPr>
   </p:defaultTextStyle>
+  <p:extLst>
+    <p:ext uri="{EFAFB233-063F-42B5-8137-9DF3F51BA10A}">
+      <p15:sldGuideLst xmlns:p15="http://schemas.microsoft.com/office/powerpoint/2012/main">
+        <p15:guide id="1" orient="horz" pos="2160" userDrawn="1">
+          <p15:clr>
+            <a:srgbClr val="A4A3A4"/>
+          </p15:clr>
+        </p15:guide>
+        <p15:guide id="2" pos="3840" userDrawn="1">
+          <p15:clr>
+            <a:srgbClr val="A4A3A4"/>
+          </p15:clr>
+        </p15:guide>
+        <p15:guide id="3" pos="3940" userDrawn="1">
+          <p15:clr>
+            <a:srgbClr val="A4A3A4"/>
+          </p15:clr>
+        </p15:guide>
+      </p15:sldGuideLst>
+    </p:ext>
+  </p:extLst>
 </p:presentation>
 </file>
 
@@ -3323,10 +3345,10 @@
       </p:grpSpPr>
       <p:sp>
         <p:nvSpPr>
-          <p:cNvPr id="63" name="Rectangle 62">
-            <a:extLst>
-              <a:ext uri="{FF2B5EF4-FFF2-40B4-BE49-F238E27FC236}">
-                <a16:creationId xmlns:a16="http://schemas.microsoft.com/office/drawing/2014/main" id="{2A7F8B6E-BAF6-490F-8119-B6501552B3B9}"/>
+          <p:cNvPr id="31" name="Rectangle 30">
+            <a:extLst>
+              <a:ext uri="{FF2B5EF4-FFF2-40B4-BE49-F238E27FC236}">
+                <a16:creationId xmlns:a16="http://schemas.microsoft.com/office/drawing/2014/main" id="{8534C2E9-CC49-4E53-AF65-ED85F4A61FC9}"/>
               </a:ext>
             </a:extLst>
           </p:cNvPr>
@@ -3335,8 +3357,8 @@
         </p:nvSpPr>
         <p:spPr>
           <a:xfrm>
-            <a:off x="6696456" y="3169848"/>
-            <a:ext cx="1487424" cy="2389704"/>
+            <a:off x="146304" y="365688"/>
+            <a:ext cx="1487424" cy="2944368"/>
           </a:xfrm>
           <a:prstGeom prst="rect">
             <a:avLst/>
@@ -3363,16 +3385,16 @@
           <a:lstStyle/>
           <a:p>
             <a:pPr algn="ctr"/>
-            <a:endParaRPr lang="en-US"/>
-          </a:p>
-        </p:txBody>
-      </p:sp>
-      <p:sp>
-        <p:nvSpPr>
-          <p:cNvPr id="31" name="Rectangle 30">
-            <a:extLst>
-              <a:ext uri="{FF2B5EF4-FFF2-40B4-BE49-F238E27FC236}">
-                <a16:creationId xmlns:a16="http://schemas.microsoft.com/office/drawing/2014/main" id="{8534C2E9-CC49-4E53-AF65-ED85F4A61FC9}"/>
+            <a:endParaRPr lang="en-US" b="1"/>
+          </a:p>
+        </p:txBody>
+      </p:sp>
+      <p:sp>
+        <p:nvSpPr>
+          <p:cNvPr id="2" name="Rectangle: Rounded Corners 1">
+            <a:extLst>
+              <a:ext uri="{FF2B5EF4-FFF2-40B4-BE49-F238E27FC236}">
+                <a16:creationId xmlns:a16="http://schemas.microsoft.com/office/drawing/2014/main" id="{1B270861-F8EB-48E6-B003-9686270A3712}"/>
               </a:ext>
             </a:extLst>
           </p:cNvPr>
@@ -3381,8 +3403,779 @@
         </p:nvSpPr>
         <p:spPr>
           <a:xfrm>
-            <a:off x="1560576" y="2060376"/>
-            <a:ext cx="1487424" cy="2944368"/>
+            <a:off x="213360" y="444936"/>
+            <a:ext cx="1322832" cy="445008"/>
+          </a:xfrm>
+          <a:prstGeom prst="roundRect">
+            <a:avLst/>
+          </a:prstGeom>
+        </p:spPr>
+        <p:style>
+          <a:lnRef idx="2">
+            <a:schemeClr val="accent2">
+              <a:shade val="50000"/>
+            </a:schemeClr>
+          </a:lnRef>
+          <a:fillRef idx="1">
+            <a:schemeClr val="accent2"/>
+          </a:fillRef>
+          <a:effectRef idx="0">
+            <a:schemeClr val="accent2"/>
+          </a:effectRef>
+          <a:fontRef idx="minor">
+            <a:schemeClr val="lt1"/>
+          </a:fontRef>
+        </p:style>
+        <p:txBody>
+          <a:bodyPr rtlCol="0" anchor="ctr"/>
+          <a:lstStyle/>
+          <a:p>
+            <a:pPr algn="ctr"/>
+            <a:r>
+              <a:rPr lang="en-US" sz="1400" b="1" dirty="0" err="1"/>
+              <a:t>Blockly</a:t>
+            </a:r>
+            <a:endParaRPr lang="en-US" sz="1400" b="1" dirty="0"/>
+          </a:p>
+        </p:txBody>
+      </p:sp>
+      <p:sp>
+        <p:nvSpPr>
+          <p:cNvPr id="3" name="Rectangle: Rounded Corners 2">
+            <a:extLst>
+              <a:ext uri="{FF2B5EF4-FFF2-40B4-BE49-F238E27FC236}">
+                <a16:creationId xmlns:a16="http://schemas.microsoft.com/office/drawing/2014/main" id="{35626BB9-003B-4ECB-900D-5064A53FC121}"/>
+              </a:ext>
+            </a:extLst>
+          </p:cNvPr>
+          <p:cNvSpPr/>
+          <p:nvPr/>
+        </p:nvSpPr>
+        <p:spPr>
+          <a:xfrm>
+            <a:off x="213360" y="1030152"/>
+            <a:ext cx="1322832" cy="445008"/>
+          </a:xfrm>
+          <a:prstGeom prst="roundRect">
+            <a:avLst/>
+          </a:prstGeom>
+        </p:spPr>
+        <p:style>
+          <a:lnRef idx="2">
+            <a:schemeClr val="accent2">
+              <a:shade val="50000"/>
+            </a:schemeClr>
+          </a:lnRef>
+          <a:fillRef idx="1">
+            <a:schemeClr val="accent2"/>
+          </a:fillRef>
+          <a:effectRef idx="0">
+            <a:schemeClr val="accent2"/>
+          </a:effectRef>
+          <a:fontRef idx="minor">
+            <a:schemeClr val="lt1"/>
+          </a:fontRef>
+        </p:style>
+        <p:txBody>
+          <a:bodyPr rtlCol="0" anchor="ctr"/>
+          <a:lstStyle/>
+          <a:p>
+            <a:pPr algn="ctr"/>
+            <a:r>
+              <a:rPr lang="en-US" sz="1400" b="1" dirty="0"/>
+              <a:t>JavaScript</a:t>
+            </a:r>
+          </a:p>
+        </p:txBody>
+      </p:sp>
+      <p:sp>
+        <p:nvSpPr>
+          <p:cNvPr id="4" name="Rectangle: Rounded Corners 3">
+            <a:extLst>
+              <a:ext uri="{FF2B5EF4-FFF2-40B4-BE49-F238E27FC236}">
+                <a16:creationId xmlns:a16="http://schemas.microsoft.com/office/drawing/2014/main" id="{484CA61D-3659-451C-AFD4-A248CA5765FE}"/>
+              </a:ext>
+            </a:extLst>
+          </p:cNvPr>
+          <p:cNvSpPr/>
+          <p:nvPr/>
+        </p:nvSpPr>
+        <p:spPr>
+          <a:xfrm>
+            <a:off x="213360" y="1609272"/>
+            <a:ext cx="1322832" cy="445008"/>
+          </a:xfrm>
+          <a:prstGeom prst="roundRect">
+            <a:avLst/>
+          </a:prstGeom>
+        </p:spPr>
+        <p:style>
+          <a:lnRef idx="2">
+            <a:schemeClr val="accent1">
+              <a:shade val="50000"/>
+            </a:schemeClr>
+          </a:lnRef>
+          <a:fillRef idx="1">
+            <a:schemeClr val="accent1"/>
+          </a:fillRef>
+          <a:effectRef idx="0">
+            <a:schemeClr val="accent1"/>
+          </a:effectRef>
+          <a:fontRef idx="minor">
+            <a:schemeClr val="lt1"/>
+          </a:fontRef>
+        </p:style>
+        <p:txBody>
+          <a:bodyPr rtlCol="0" anchor="ctr"/>
+          <a:lstStyle/>
+          <a:p>
+            <a:pPr algn="ctr"/>
+            <a:r>
+              <a:rPr lang="en-US" sz="1400" b="1" dirty="0"/>
+              <a:t>User</a:t>
+            </a:r>
+          </a:p>
+          <a:p>
+            <a:pPr algn="ctr"/>
+            <a:r>
+              <a:rPr lang="en-US" sz="1400" b="1" dirty="0"/>
+              <a:t>Machine Code</a:t>
+            </a:r>
+          </a:p>
+        </p:txBody>
+      </p:sp>
+      <p:sp>
+        <p:nvSpPr>
+          <p:cNvPr id="5" name="Rectangle: Rounded Corners 4">
+            <a:extLst>
+              <a:ext uri="{FF2B5EF4-FFF2-40B4-BE49-F238E27FC236}">
+                <a16:creationId xmlns:a16="http://schemas.microsoft.com/office/drawing/2014/main" id="{086C4C7A-7942-4799-858E-F6B1AEE57FA6}"/>
+              </a:ext>
+            </a:extLst>
+          </p:cNvPr>
+          <p:cNvSpPr/>
+          <p:nvPr/>
+        </p:nvSpPr>
+        <p:spPr>
+          <a:xfrm>
+            <a:off x="213360" y="2749224"/>
+            <a:ext cx="1322832" cy="445008"/>
+          </a:xfrm>
+          <a:prstGeom prst="roundRect">
+            <a:avLst/>
+          </a:prstGeom>
+        </p:spPr>
+        <p:style>
+          <a:lnRef idx="2">
+            <a:schemeClr val="accent1">
+              <a:shade val="50000"/>
+            </a:schemeClr>
+          </a:lnRef>
+          <a:fillRef idx="1">
+            <a:schemeClr val="accent1"/>
+          </a:fillRef>
+          <a:effectRef idx="0">
+            <a:schemeClr val="accent1"/>
+          </a:effectRef>
+          <a:fontRef idx="minor">
+            <a:schemeClr val="lt1"/>
+          </a:fontRef>
+        </p:style>
+        <p:txBody>
+          <a:bodyPr rtlCol="0" anchor="ctr"/>
+          <a:lstStyle/>
+          <a:p>
+            <a:pPr algn="ctr"/>
+            <a:r>
+              <a:rPr lang="en-US" sz="1400" b="1" dirty="0"/>
+              <a:t>Runtime</a:t>
+            </a:r>
+          </a:p>
+          <a:p>
+            <a:pPr algn="ctr"/>
+            <a:r>
+              <a:rPr lang="en-US" sz="1400" b="1" dirty="0"/>
+              <a:t>Machine Code</a:t>
+            </a:r>
+          </a:p>
+        </p:txBody>
+      </p:sp>
+      <p:sp>
+        <p:nvSpPr>
+          <p:cNvPr id="6" name="Rectangle: Rounded Corners 5">
+            <a:extLst>
+              <a:ext uri="{FF2B5EF4-FFF2-40B4-BE49-F238E27FC236}">
+                <a16:creationId xmlns:a16="http://schemas.microsoft.com/office/drawing/2014/main" id="{FF3F2348-6021-4004-8102-D240E16554DB}"/>
+              </a:ext>
+            </a:extLst>
+          </p:cNvPr>
+          <p:cNvSpPr/>
+          <p:nvPr/>
+        </p:nvSpPr>
+        <p:spPr>
+          <a:xfrm>
+            <a:off x="213360" y="3398448"/>
+            <a:ext cx="1322832" cy="445008"/>
+          </a:xfrm>
+          <a:prstGeom prst="roundRect">
+            <a:avLst/>
+          </a:prstGeom>
+        </p:spPr>
+        <p:style>
+          <a:lnRef idx="2">
+            <a:schemeClr val="accent1">
+              <a:shade val="50000"/>
+            </a:schemeClr>
+          </a:lnRef>
+          <a:fillRef idx="1">
+            <a:schemeClr val="accent1"/>
+          </a:fillRef>
+          <a:effectRef idx="0">
+            <a:schemeClr val="accent1"/>
+          </a:effectRef>
+          <a:fontRef idx="minor">
+            <a:schemeClr val="lt1"/>
+          </a:fontRef>
+        </p:style>
+        <p:txBody>
+          <a:bodyPr rtlCol="0" anchor="ctr"/>
+          <a:lstStyle/>
+          <a:p>
+            <a:pPr algn="ctr"/>
+            <a:r>
+              <a:rPr lang="en-US" sz="1400" b="1" dirty="0"/>
+              <a:t>C++ runtime</a:t>
+            </a:r>
+          </a:p>
+        </p:txBody>
+      </p:sp>
+      <p:sp>
+        <p:nvSpPr>
+          <p:cNvPr id="7" name="Oval 6">
+            <a:extLst>
+              <a:ext uri="{FF2B5EF4-FFF2-40B4-BE49-F238E27FC236}">
+                <a16:creationId xmlns:a16="http://schemas.microsoft.com/office/drawing/2014/main" id="{72F2E1F3-14E5-4C0B-B6A7-9349A8B743AA}"/>
+              </a:ext>
+            </a:extLst>
+          </p:cNvPr>
+          <p:cNvSpPr/>
+          <p:nvPr/>
+        </p:nvSpPr>
+        <p:spPr>
+          <a:xfrm>
+            <a:off x="304800" y="2185344"/>
+            <a:ext cx="1139952" cy="420624"/>
+          </a:xfrm>
+          <a:prstGeom prst="ellipse">
+            <a:avLst/>
+          </a:prstGeom>
+        </p:spPr>
+        <p:style>
+          <a:lnRef idx="2">
+            <a:schemeClr val="accent6">
+              <a:shade val="50000"/>
+            </a:schemeClr>
+          </a:lnRef>
+          <a:fillRef idx="1">
+            <a:schemeClr val="accent6"/>
+          </a:fillRef>
+          <a:effectRef idx="0">
+            <a:schemeClr val="accent6"/>
+          </a:effectRef>
+          <a:fontRef idx="minor">
+            <a:schemeClr val="lt1"/>
+          </a:fontRef>
+        </p:style>
+        <p:txBody>
+          <a:bodyPr rtlCol="0" anchor="ctr"/>
+          <a:lstStyle/>
+          <a:p>
+            <a:pPr algn="ctr"/>
+            <a:r>
+              <a:rPr lang="en-US" sz="1400" b="1" dirty="0"/>
+              <a:t>link</a:t>
+            </a:r>
+          </a:p>
+        </p:txBody>
+      </p:sp>
+      <p:sp>
+        <p:nvSpPr>
+          <p:cNvPr id="8" name="Rectangle: Rounded Corners 7">
+            <a:extLst>
+              <a:ext uri="{FF2B5EF4-FFF2-40B4-BE49-F238E27FC236}">
+                <a16:creationId xmlns:a16="http://schemas.microsoft.com/office/drawing/2014/main" id="{A3946FBF-CD60-45BC-9EEE-0FCD70BE394F}"/>
+              </a:ext>
+            </a:extLst>
+          </p:cNvPr>
+          <p:cNvSpPr/>
+          <p:nvPr/>
+        </p:nvSpPr>
+        <p:spPr>
+          <a:xfrm>
+            <a:off x="1786128" y="459730"/>
+            <a:ext cx="1018032" cy="445008"/>
+          </a:xfrm>
+          <a:prstGeom prst="roundRect">
+            <a:avLst/>
+          </a:prstGeom>
+        </p:spPr>
+        <p:style>
+          <a:lnRef idx="2">
+            <a:schemeClr val="accent1">
+              <a:shade val="50000"/>
+            </a:schemeClr>
+          </a:lnRef>
+          <a:fillRef idx="1">
+            <a:schemeClr val="accent1"/>
+          </a:fillRef>
+          <a:effectRef idx="0">
+            <a:schemeClr val="accent1"/>
+          </a:effectRef>
+          <a:fontRef idx="minor">
+            <a:schemeClr val="lt1"/>
+          </a:fontRef>
+        </p:style>
+        <p:txBody>
+          <a:bodyPr rtlCol="0" anchor="ctr"/>
+          <a:lstStyle/>
+          <a:p>
+            <a:pPr algn="ctr"/>
+            <a:r>
+              <a:rPr lang="en-US" sz="1200" b="1" dirty="0"/>
+              <a:t>Final</a:t>
+            </a:r>
+          </a:p>
+          <a:p>
+            <a:pPr algn="ctr"/>
+            <a:r>
+              <a:rPr lang="en-US" sz="1200" b="1" dirty="0"/>
+              <a:t>Executable</a:t>
+            </a:r>
+          </a:p>
+        </p:txBody>
+      </p:sp>
+      <p:cxnSp>
+        <p:nvCxnSpPr>
+          <p:cNvPr id="11" name="Straight Arrow Connector 10">
+            <a:extLst>
+              <a:ext uri="{FF2B5EF4-FFF2-40B4-BE49-F238E27FC236}">
+                <a16:creationId xmlns:a16="http://schemas.microsoft.com/office/drawing/2014/main" id="{804910A7-5F66-4F32-BD34-2CA1FF6214C6}"/>
+              </a:ext>
+            </a:extLst>
+          </p:cNvPr>
+          <p:cNvCxnSpPr/>
+          <p:nvPr/>
+        </p:nvCxnSpPr>
+        <p:spPr>
+          <a:xfrm>
+            <a:off x="874776" y="889944"/>
+            <a:ext cx="0" cy="140208"/>
+          </a:xfrm>
+          <a:prstGeom prst="straightConnector1">
+            <a:avLst/>
+          </a:prstGeom>
+          <a:ln w="28575">
+            <a:tailEnd type="triangle"/>
+          </a:ln>
+        </p:spPr>
+        <p:style>
+          <a:lnRef idx="1">
+            <a:schemeClr val="accent1"/>
+          </a:lnRef>
+          <a:fillRef idx="0">
+            <a:schemeClr val="accent1"/>
+          </a:fillRef>
+          <a:effectRef idx="0">
+            <a:schemeClr val="accent1"/>
+          </a:effectRef>
+          <a:fontRef idx="minor">
+            <a:schemeClr val="tx1"/>
+          </a:fontRef>
+        </p:style>
+      </p:cxnSp>
+      <p:cxnSp>
+        <p:nvCxnSpPr>
+          <p:cNvPr id="13" name="Straight Arrow Connector 12">
+            <a:extLst>
+              <a:ext uri="{FF2B5EF4-FFF2-40B4-BE49-F238E27FC236}">
+                <a16:creationId xmlns:a16="http://schemas.microsoft.com/office/drawing/2014/main" id="{4D43BCFF-C0C2-4EDA-BF7C-1499D9038BF5}"/>
+              </a:ext>
+            </a:extLst>
+          </p:cNvPr>
+          <p:cNvCxnSpPr>
+            <a:cxnSpLocks/>
+          </p:cNvCxnSpPr>
+          <p:nvPr/>
+        </p:nvCxnSpPr>
+        <p:spPr>
+          <a:xfrm>
+            <a:off x="874776" y="1475160"/>
+            <a:ext cx="0" cy="134112"/>
+          </a:xfrm>
+          <a:prstGeom prst="straightConnector1">
+            <a:avLst/>
+          </a:prstGeom>
+          <a:ln w="28575">
+            <a:tailEnd type="triangle"/>
+          </a:ln>
+        </p:spPr>
+        <p:style>
+          <a:lnRef idx="1">
+            <a:schemeClr val="accent1"/>
+          </a:lnRef>
+          <a:fillRef idx="0">
+            <a:schemeClr val="accent1"/>
+          </a:fillRef>
+          <a:effectRef idx="0">
+            <a:schemeClr val="accent1"/>
+          </a:effectRef>
+          <a:fontRef idx="minor">
+            <a:schemeClr val="tx1"/>
+          </a:fontRef>
+        </p:style>
+      </p:cxnSp>
+      <p:cxnSp>
+        <p:nvCxnSpPr>
+          <p:cNvPr id="22" name="Straight Arrow Connector 21">
+            <a:extLst>
+              <a:ext uri="{FF2B5EF4-FFF2-40B4-BE49-F238E27FC236}">
+                <a16:creationId xmlns:a16="http://schemas.microsoft.com/office/drawing/2014/main" id="{5A15EF70-57A5-4813-9157-FABDA6D37E83}"/>
+              </a:ext>
+            </a:extLst>
+          </p:cNvPr>
+          <p:cNvCxnSpPr>
+            <a:cxnSpLocks/>
+          </p:cNvCxnSpPr>
+          <p:nvPr/>
+        </p:nvCxnSpPr>
+        <p:spPr>
+          <a:xfrm>
+            <a:off x="874776" y="2054280"/>
+            <a:ext cx="0" cy="131064"/>
+          </a:xfrm>
+          <a:prstGeom prst="straightConnector1">
+            <a:avLst/>
+          </a:prstGeom>
+          <a:ln w="28575">
+            <a:tailEnd type="triangle"/>
+          </a:ln>
+        </p:spPr>
+        <p:style>
+          <a:lnRef idx="1">
+            <a:schemeClr val="accent1"/>
+          </a:lnRef>
+          <a:fillRef idx="0">
+            <a:schemeClr val="accent1"/>
+          </a:fillRef>
+          <a:effectRef idx="0">
+            <a:schemeClr val="accent1"/>
+          </a:effectRef>
+          <a:fontRef idx="minor">
+            <a:schemeClr val="tx1"/>
+          </a:fontRef>
+        </p:style>
+      </p:cxnSp>
+      <p:cxnSp>
+        <p:nvCxnSpPr>
+          <p:cNvPr id="25" name="Straight Arrow Connector 24">
+            <a:extLst>
+              <a:ext uri="{FF2B5EF4-FFF2-40B4-BE49-F238E27FC236}">
+                <a16:creationId xmlns:a16="http://schemas.microsoft.com/office/drawing/2014/main" id="{DF2DBE3E-9A19-4A2C-97C6-265868FEA8E9}"/>
+              </a:ext>
+            </a:extLst>
+          </p:cNvPr>
+          <p:cNvCxnSpPr>
+            <a:cxnSpLocks/>
+          </p:cNvCxnSpPr>
+          <p:nvPr/>
+        </p:nvCxnSpPr>
+        <p:spPr>
+          <a:xfrm flipV="1">
+            <a:off x="874776" y="3194232"/>
+            <a:ext cx="0" cy="204216"/>
+          </a:xfrm>
+          <a:prstGeom prst="straightConnector1">
+            <a:avLst/>
+          </a:prstGeom>
+          <a:ln w="28575">
+            <a:tailEnd type="triangle"/>
+          </a:ln>
+        </p:spPr>
+        <p:style>
+          <a:lnRef idx="1">
+            <a:schemeClr val="accent1"/>
+          </a:lnRef>
+          <a:fillRef idx="0">
+            <a:schemeClr val="accent1"/>
+          </a:fillRef>
+          <a:effectRef idx="0">
+            <a:schemeClr val="accent1"/>
+          </a:effectRef>
+          <a:fontRef idx="minor">
+            <a:schemeClr val="tx1"/>
+          </a:fontRef>
+        </p:style>
+      </p:cxnSp>
+      <p:cxnSp>
+        <p:nvCxnSpPr>
+          <p:cNvPr id="28" name="Straight Arrow Connector 27">
+            <a:extLst>
+              <a:ext uri="{FF2B5EF4-FFF2-40B4-BE49-F238E27FC236}">
+                <a16:creationId xmlns:a16="http://schemas.microsoft.com/office/drawing/2014/main" id="{3F9C5852-C102-41BC-8C8F-5581198C54F3}"/>
+              </a:ext>
+            </a:extLst>
+          </p:cNvPr>
+          <p:cNvCxnSpPr>
+            <a:cxnSpLocks/>
+          </p:cNvCxnSpPr>
+          <p:nvPr/>
+        </p:nvCxnSpPr>
+        <p:spPr>
+          <a:xfrm flipV="1">
+            <a:off x="874776" y="2605968"/>
+            <a:ext cx="0" cy="143256"/>
+          </a:xfrm>
+          <a:prstGeom prst="straightConnector1">
+            <a:avLst/>
+          </a:prstGeom>
+          <a:ln w="28575">
+            <a:tailEnd type="triangle"/>
+          </a:ln>
+        </p:spPr>
+        <p:style>
+          <a:lnRef idx="1">
+            <a:schemeClr val="accent1"/>
+          </a:lnRef>
+          <a:fillRef idx="0">
+            <a:schemeClr val="accent1"/>
+          </a:fillRef>
+          <a:effectRef idx="0">
+            <a:schemeClr val="accent1"/>
+          </a:effectRef>
+          <a:fontRef idx="minor">
+            <a:schemeClr val="tx1"/>
+          </a:fontRef>
+        </p:style>
+      </p:cxnSp>
+      <p:sp>
+        <p:nvSpPr>
+          <p:cNvPr id="38" name="Right Brace 37">
+            <a:extLst>
+              <a:ext uri="{FF2B5EF4-FFF2-40B4-BE49-F238E27FC236}">
+                <a16:creationId xmlns:a16="http://schemas.microsoft.com/office/drawing/2014/main" id="{B7F1C21F-95DB-4E5A-9ABE-E0FA4DFB428D}"/>
+              </a:ext>
+            </a:extLst>
+          </p:cNvPr>
+          <p:cNvSpPr/>
+          <p:nvPr/>
+        </p:nvSpPr>
+        <p:spPr>
+          <a:xfrm>
+            <a:off x="1726690" y="2996040"/>
+            <a:ext cx="187453" cy="653832"/>
+          </a:xfrm>
+          <a:prstGeom prst="rightBrace">
+            <a:avLst>
+              <a:gd name="adj1" fmla="val 138413"/>
+              <a:gd name="adj2" fmla="val 51747"/>
+            </a:avLst>
+          </a:prstGeom>
+          <a:ln w="28575"/>
+        </p:spPr>
+        <p:style>
+          <a:lnRef idx="1">
+            <a:schemeClr val="accent1"/>
+          </a:lnRef>
+          <a:fillRef idx="0">
+            <a:schemeClr val="accent1"/>
+          </a:fillRef>
+          <a:effectRef idx="0">
+            <a:schemeClr val="accent1"/>
+          </a:effectRef>
+          <a:fontRef idx="minor">
+            <a:schemeClr val="tx1"/>
+          </a:fontRef>
+        </p:style>
+        <p:txBody>
+          <a:bodyPr rtlCol="0" anchor="ctr"/>
+          <a:lstStyle/>
+          <a:p>
+            <a:pPr algn="ctr"/>
+            <a:endParaRPr lang="en-US" b="1"/>
+          </a:p>
+        </p:txBody>
+      </p:sp>
+      <p:sp>
+        <p:nvSpPr>
+          <p:cNvPr id="39" name="TextBox 38">
+            <a:extLst>
+              <a:ext uri="{FF2B5EF4-FFF2-40B4-BE49-F238E27FC236}">
+                <a16:creationId xmlns:a16="http://schemas.microsoft.com/office/drawing/2014/main" id="{36493342-CC99-4F2D-B04B-AB5ACFD289F8}"/>
+              </a:ext>
+            </a:extLst>
+          </p:cNvPr>
+          <p:cNvSpPr txBox="1"/>
+          <p:nvPr/>
+        </p:nvSpPr>
+        <p:spPr>
+          <a:xfrm>
+            <a:off x="2062015" y="2940724"/>
+            <a:ext cx="776879" cy="738664"/>
+          </a:xfrm>
+          <a:prstGeom prst="rect">
+            <a:avLst/>
+          </a:prstGeom>
+          <a:noFill/>
+        </p:spPr>
+        <p:txBody>
+          <a:bodyPr wrap="none" rtlCol="0">
+            <a:spAutoFit/>
+          </a:bodyPr>
+          <a:lstStyle/>
+          <a:p>
+            <a:r>
+              <a:rPr lang="en-US" sz="1400" b="1" dirty="0"/>
+              <a:t>a priori</a:t>
+            </a:r>
+          </a:p>
+          <a:p>
+            <a:r>
+              <a:rPr lang="en-US" sz="1400" b="1" dirty="0"/>
+              <a:t>cloud</a:t>
+            </a:r>
+          </a:p>
+          <a:p>
+            <a:r>
+              <a:rPr lang="en-US" sz="1400" b="1" dirty="0"/>
+              <a:t>compile</a:t>
+            </a:r>
+          </a:p>
+        </p:txBody>
+      </p:sp>
+      <p:sp>
+        <p:nvSpPr>
+          <p:cNvPr id="40" name="TextBox 39">
+            <a:extLst>
+              <a:ext uri="{FF2B5EF4-FFF2-40B4-BE49-F238E27FC236}">
+                <a16:creationId xmlns:a16="http://schemas.microsoft.com/office/drawing/2014/main" id="{10121E58-91F7-44E0-BEBE-FD88F0AABD39}"/>
+              </a:ext>
+            </a:extLst>
+          </p:cNvPr>
+          <p:cNvSpPr txBox="1"/>
+          <p:nvPr/>
+        </p:nvSpPr>
+        <p:spPr>
+          <a:xfrm>
+            <a:off x="93871" y="60924"/>
+            <a:ext cx="1656287" cy="307777"/>
+          </a:xfrm>
+          <a:prstGeom prst="rect">
+            <a:avLst/>
+          </a:prstGeom>
+          <a:noFill/>
+        </p:spPr>
+        <p:txBody>
+          <a:bodyPr wrap="none" rtlCol="0">
+            <a:spAutoFit/>
+          </a:bodyPr>
+          <a:lstStyle/>
+          <a:p>
+            <a:r>
+              <a:rPr lang="en-US" sz="1400" b="1" dirty="0"/>
+              <a:t>MakeCode web app</a:t>
+            </a:r>
+          </a:p>
+        </p:txBody>
+      </p:sp>
+      <p:cxnSp>
+        <p:nvCxnSpPr>
+          <p:cNvPr id="84" name="Connector: Elbow 83">
+            <a:extLst>
+              <a:ext uri="{FF2B5EF4-FFF2-40B4-BE49-F238E27FC236}">
+                <a16:creationId xmlns:a16="http://schemas.microsoft.com/office/drawing/2014/main" id="{5036BF24-5A14-4207-8105-6BD37EC6558A}"/>
+              </a:ext>
+            </a:extLst>
+          </p:cNvPr>
+          <p:cNvCxnSpPr>
+            <a:cxnSpLocks/>
+            <a:stCxn id="7" idx="6"/>
+            <a:endCxn id="8" idx="2"/>
+          </p:cNvCxnSpPr>
+          <p:nvPr/>
+        </p:nvCxnSpPr>
+        <p:spPr>
+          <a:xfrm flipV="1">
+            <a:off x="1444752" y="904738"/>
+            <a:ext cx="850392" cy="1490918"/>
+          </a:xfrm>
+          <a:prstGeom prst="bentConnector2">
+            <a:avLst/>
+          </a:prstGeom>
+          <a:ln w="28575">
+            <a:tailEnd type="triangle"/>
+          </a:ln>
+        </p:spPr>
+        <p:style>
+          <a:lnRef idx="1">
+            <a:schemeClr val="accent1"/>
+          </a:lnRef>
+          <a:fillRef idx="0">
+            <a:schemeClr val="accent1"/>
+          </a:fillRef>
+          <a:effectRef idx="0">
+            <a:schemeClr val="accent1"/>
+          </a:effectRef>
+          <a:fontRef idx="minor">
+            <a:schemeClr val="tx1"/>
+          </a:fontRef>
+        </p:style>
+      </p:cxnSp>
+    </p:spTree>
+    <p:extLst>
+      <p:ext uri="{BB962C8B-B14F-4D97-AF65-F5344CB8AC3E}">
+        <p14:creationId xmlns:p14="http://schemas.microsoft.com/office/powerpoint/2010/main" val="3489256861"/>
+      </p:ext>
+    </p:extLst>
+  </p:cSld>
+  <p:clrMapOvr>
+    <a:masterClrMapping/>
+  </p:clrMapOvr>
+</p:sld>
+</file>
+
+<file path=ppt/slides/slide2.xml><?xml version="1.0" encoding="utf-8"?>
+<p:sld xmlns:a="http://schemas.openxmlformats.org/drawingml/2006/main" xmlns:r="http://schemas.openxmlformats.org/officeDocument/2006/relationships" xmlns:p="http://schemas.openxmlformats.org/presentationml/2006/main">
+  <p:cSld>
+    <p:spTree>
+      <p:nvGrpSpPr>
+        <p:cNvPr id="1" name=""/>
+        <p:cNvGrpSpPr/>
+        <p:nvPr/>
+      </p:nvGrpSpPr>
+      <p:grpSpPr>
+        <a:xfrm>
+          <a:off x="0" y="0"/>
+          <a:ext cx="0" cy="0"/>
+          <a:chOff x="0" y="0"/>
+          <a:chExt cx="0" cy="0"/>
+        </a:xfrm>
+      </p:grpSpPr>
+      <p:sp>
+        <p:nvSpPr>
+          <p:cNvPr id="63" name="Rectangle 62">
+            <a:extLst>
+              <a:ext uri="{FF2B5EF4-FFF2-40B4-BE49-F238E27FC236}">
+                <a16:creationId xmlns:a16="http://schemas.microsoft.com/office/drawing/2014/main" id="{2A7F8B6E-BAF6-490F-8119-B6501552B3B9}"/>
+              </a:ext>
+            </a:extLst>
+          </p:cNvPr>
+          <p:cNvSpPr/>
+          <p:nvPr/>
+        </p:nvSpPr>
+        <p:spPr>
+          <a:xfrm>
+            <a:off x="179832" y="1729741"/>
+            <a:ext cx="1487424" cy="2470403"/>
           </a:xfrm>
           <a:prstGeom prst="rect">
             <a:avLst/>
@@ -3409,16 +4202,16 @@
           <a:lstStyle/>
           <a:p>
             <a:pPr algn="ctr"/>
-            <a:endParaRPr lang="en-US"/>
-          </a:p>
-        </p:txBody>
-      </p:sp>
-      <p:sp>
-        <p:nvSpPr>
-          <p:cNvPr id="2" name="Rectangle: Rounded Corners 1">
-            <a:extLst>
-              <a:ext uri="{FF2B5EF4-FFF2-40B4-BE49-F238E27FC236}">
-                <a16:creationId xmlns:a16="http://schemas.microsoft.com/office/drawing/2014/main" id="{1B270861-F8EB-48E6-B003-9686270A3712}"/>
+            <a:endParaRPr lang="en-US" b="1"/>
+          </a:p>
+        </p:txBody>
+      </p:sp>
+      <p:sp>
+        <p:nvSpPr>
+          <p:cNvPr id="41" name="Rectangle 40">
+            <a:extLst>
+              <a:ext uri="{FF2B5EF4-FFF2-40B4-BE49-F238E27FC236}">
+                <a16:creationId xmlns:a16="http://schemas.microsoft.com/office/drawing/2014/main" id="{394408B5-1179-4E9C-AF56-0891872F5F47}"/>
               </a:ext>
             </a:extLst>
           </p:cNvPr>
@@ -3427,7 +4220,53 @@
         </p:nvSpPr>
         <p:spPr>
           <a:xfrm>
-            <a:off x="1627632" y="2139624"/>
+            <a:off x="179832" y="406837"/>
+            <a:ext cx="1487424" cy="1182696"/>
+          </a:xfrm>
+          <a:prstGeom prst="rect">
+            <a:avLst/>
+          </a:prstGeom>
+        </p:spPr>
+        <p:style>
+          <a:lnRef idx="2">
+            <a:schemeClr val="accent3">
+              <a:shade val="50000"/>
+            </a:schemeClr>
+          </a:lnRef>
+          <a:fillRef idx="1">
+            <a:schemeClr val="accent3"/>
+          </a:fillRef>
+          <a:effectRef idx="0">
+            <a:schemeClr val="accent3"/>
+          </a:effectRef>
+          <a:fontRef idx="minor">
+            <a:schemeClr val="lt1"/>
+          </a:fontRef>
+        </p:style>
+        <p:txBody>
+          <a:bodyPr rtlCol="0" anchor="ctr"/>
+          <a:lstStyle/>
+          <a:p>
+            <a:pPr algn="ctr"/>
+            <a:endParaRPr lang="en-US" b="1"/>
+          </a:p>
+        </p:txBody>
+      </p:sp>
+      <p:sp>
+        <p:nvSpPr>
+          <p:cNvPr id="42" name="Rectangle: Rounded Corners 41">
+            <a:extLst>
+              <a:ext uri="{FF2B5EF4-FFF2-40B4-BE49-F238E27FC236}">
+                <a16:creationId xmlns:a16="http://schemas.microsoft.com/office/drawing/2014/main" id="{C89350E1-E03D-45A0-9496-67EFA3B1A97F}"/>
+              </a:ext>
+            </a:extLst>
+          </p:cNvPr>
+          <p:cNvSpPr/>
+          <p:nvPr/>
+        </p:nvSpPr>
+        <p:spPr>
+          <a:xfrm>
+            <a:off x="241019" y="486085"/>
             <a:ext cx="1322832" cy="445008"/>
           </a:xfrm>
           <a:prstGeom prst="roundRect">
@@ -3456,19 +4295,19 @@
           <a:p>
             <a:pPr algn="ctr"/>
             <a:r>
-              <a:rPr lang="en-US" sz="1400" dirty="0" err="1"/>
+              <a:rPr lang="en-US" sz="1400" b="1" dirty="0" err="1"/>
               <a:t>Blockly</a:t>
             </a:r>
-            <a:endParaRPr lang="en-US" sz="1400" dirty="0"/>
-          </a:p>
-        </p:txBody>
-      </p:sp>
-      <p:sp>
-        <p:nvSpPr>
-          <p:cNvPr id="3" name="Rectangle: Rounded Corners 2">
-            <a:extLst>
-              <a:ext uri="{FF2B5EF4-FFF2-40B4-BE49-F238E27FC236}">
-                <a16:creationId xmlns:a16="http://schemas.microsoft.com/office/drawing/2014/main" id="{35626BB9-003B-4ECB-900D-5064A53FC121}"/>
+            <a:endParaRPr lang="en-US" sz="1400" b="1" dirty="0"/>
+          </a:p>
+        </p:txBody>
+      </p:sp>
+      <p:sp>
+        <p:nvSpPr>
+          <p:cNvPr id="43" name="Rectangle: Rounded Corners 42">
+            <a:extLst>
+              <a:ext uri="{FF2B5EF4-FFF2-40B4-BE49-F238E27FC236}">
+                <a16:creationId xmlns:a16="http://schemas.microsoft.com/office/drawing/2014/main" id="{CF5B4151-D2C6-442E-BF94-B7DA552439E2}"/>
               </a:ext>
             </a:extLst>
           </p:cNvPr>
@@ -3477,7 +4316,7 @@
         </p:nvSpPr>
         <p:spPr>
           <a:xfrm>
-            <a:off x="1627632" y="2724840"/>
+            <a:off x="241019" y="1071301"/>
             <a:ext cx="1322832" cy="445008"/>
           </a:xfrm>
           <a:prstGeom prst="roundRect">
@@ -3506,18 +4345,25 @@
           <a:p>
             <a:pPr algn="ctr"/>
             <a:r>
-              <a:rPr lang="en-US" sz="1400" dirty="0"/>
-              <a:t>JavaScript</a:t>
-            </a:r>
-          </a:p>
-        </p:txBody>
-      </p:sp>
-      <p:sp>
-        <p:nvSpPr>
-          <p:cNvPr id="4" name="Rectangle: Rounded Corners 3">
-            <a:extLst>
-              <a:ext uri="{FF2B5EF4-FFF2-40B4-BE49-F238E27FC236}">
-                <a16:creationId xmlns:a16="http://schemas.microsoft.com/office/drawing/2014/main" id="{484CA61D-3659-451C-AFD4-A248CA5765FE}"/>
+              <a:rPr lang="en-US" sz="1400" b="1" dirty="0"/>
+              <a:t>User</a:t>
+            </a:r>
+          </a:p>
+          <a:p>
+            <a:pPr algn="ctr"/>
+            <a:r>
+              <a:rPr lang="en-US" sz="1400" b="1" dirty="0"/>
+              <a:t>Program text</a:t>
+            </a:r>
+          </a:p>
+        </p:txBody>
+      </p:sp>
+      <p:sp>
+        <p:nvSpPr>
+          <p:cNvPr id="45" name="Rectangle: Rounded Corners 44">
+            <a:extLst>
+              <a:ext uri="{FF2B5EF4-FFF2-40B4-BE49-F238E27FC236}">
+                <a16:creationId xmlns:a16="http://schemas.microsoft.com/office/drawing/2014/main" id="{978CC538-ADCD-4ACB-94E5-C993855873C5}"/>
               </a:ext>
             </a:extLst>
           </p:cNvPr>
@@ -3526,7 +4372,7 @@
         </p:nvSpPr>
         <p:spPr>
           <a:xfrm>
-            <a:off x="1627632" y="3303960"/>
+            <a:off x="241019" y="3627048"/>
             <a:ext cx="1322832" cy="445008"/>
           </a:xfrm>
           <a:prstGeom prst="roundRect">
@@ -3555,14 +4401,14 @@
           <a:p>
             <a:pPr algn="ctr"/>
             <a:r>
-              <a:rPr lang="en-US" sz="1400" dirty="0"/>
-              <a:t>User</a:t>
+              <a:rPr lang="en-US" sz="1400" b="1" dirty="0"/>
+              <a:t>Runtime</a:t>
             </a:r>
           </a:p>
           <a:p>
             <a:pPr algn="ctr"/>
             <a:r>
-              <a:rPr lang="en-US" sz="1400" dirty="0"/>
+              <a:rPr lang="en-US" sz="1400" b="1" dirty="0"/>
               <a:t>Machine Code</a:t>
             </a:r>
           </a:p>
@@ -3570,10 +4416,10 @@
       </p:sp>
       <p:sp>
         <p:nvSpPr>
-          <p:cNvPr id="5" name="Rectangle: Rounded Corners 4">
-            <a:extLst>
-              <a:ext uri="{FF2B5EF4-FFF2-40B4-BE49-F238E27FC236}">
-                <a16:creationId xmlns:a16="http://schemas.microsoft.com/office/drawing/2014/main" id="{086C4C7A-7942-4799-858E-F6B1AEE57FA6}"/>
+          <p:cNvPr id="46" name="Rectangle: Rounded Corners 45">
+            <a:extLst>
+              <a:ext uri="{FF2B5EF4-FFF2-40B4-BE49-F238E27FC236}">
+                <a16:creationId xmlns:a16="http://schemas.microsoft.com/office/drawing/2014/main" id="{2C90ADC8-D39D-4A4C-91B6-736F5A3513C3}"/>
               </a:ext>
             </a:extLst>
           </p:cNvPr>
@@ -3582,7 +4428,7 @@
         </p:nvSpPr>
         <p:spPr>
           <a:xfrm>
-            <a:off x="1627632" y="4443912"/>
+            <a:off x="241019" y="4276272"/>
             <a:ext cx="1322832" cy="445008"/>
           </a:xfrm>
           <a:prstGeom prst="roundRect">
@@ -3611,25 +4457,18 @@
           <a:p>
             <a:pPr algn="ctr"/>
             <a:r>
-              <a:rPr lang="en-US" sz="1400" dirty="0"/>
-              <a:t>Runtime</a:t>
-            </a:r>
-          </a:p>
-          <a:p>
-            <a:pPr algn="ctr"/>
-            <a:r>
-              <a:rPr lang="en-US" sz="1400" dirty="0"/>
-              <a:t>Machine Code</a:t>
-            </a:r>
-          </a:p>
-        </p:txBody>
-      </p:sp>
-      <p:sp>
-        <p:nvSpPr>
-          <p:cNvPr id="6" name="Rectangle: Rounded Corners 5">
-            <a:extLst>
-              <a:ext uri="{FF2B5EF4-FFF2-40B4-BE49-F238E27FC236}">
-                <a16:creationId xmlns:a16="http://schemas.microsoft.com/office/drawing/2014/main" id="{FF3F2348-6021-4004-8102-D240E16554DB}"/>
+              <a:rPr lang="en-US" sz="1400" b="1" dirty="0"/>
+              <a:t>C++ runtime</a:t>
+            </a:r>
+          </a:p>
+        </p:txBody>
+      </p:sp>
+      <p:sp>
+        <p:nvSpPr>
+          <p:cNvPr id="47" name="Oval 46">
+            <a:extLst>
+              <a:ext uri="{FF2B5EF4-FFF2-40B4-BE49-F238E27FC236}">
+                <a16:creationId xmlns:a16="http://schemas.microsoft.com/office/drawing/2014/main" id="{79A22718-7C32-4C8E-81C0-E2DE87F3DE6E}"/>
               </a:ext>
             </a:extLst>
           </p:cNvPr>
@@ -3638,56 +4477,7 @@
         </p:nvSpPr>
         <p:spPr>
           <a:xfrm>
-            <a:off x="1627632" y="5093136"/>
-            <a:ext cx="1322832" cy="445008"/>
-          </a:xfrm>
-          <a:prstGeom prst="roundRect">
-            <a:avLst/>
-          </a:prstGeom>
-        </p:spPr>
-        <p:style>
-          <a:lnRef idx="2">
-            <a:schemeClr val="accent1">
-              <a:shade val="50000"/>
-            </a:schemeClr>
-          </a:lnRef>
-          <a:fillRef idx="1">
-            <a:schemeClr val="accent1"/>
-          </a:fillRef>
-          <a:effectRef idx="0">
-            <a:schemeClr val="accent1"/>
-          </a:effectRef>
-          <a:fontRef idx="minor">
-            <a:schemeClr val="lt1"/>
-          </a:fontRef>
-        </p:style>
-        <p:txBody>
-          <a:bodyPr rtlCol="0" anchor="ctr"/>
-          <a:lstStyle/>
-          <a:p>
-            <a:pPr algn="ctr"/>
-            <a:r>
-              <a:rPr lang="en-US" sz="1400" dirty="0"/>
-              <a:t>C++ runtime</a:t>
-            </a:r>
-          </a:p>
-        </p:txBody>
-      </p:sp>
-      <p:sp>
-        <p:nvSpPr>
-          <p:cNvPr id="7" name="Oval 6">
-            <a:extLst>
-              <a:ext uri="{FF2B5EF4-FFF2-40B4-BE49-F238E27FC236}">
-                <a16:creationId xmlns:a16="http://schemas.microsoft.com/office/drawing/2014/main" id="{72F2E1F3-14E5-4C0B-B6A7-9349A8B743AA}"/>
-              </a:ext>
-            </a:extLst>
-          </p:cNvPr>
-          <p:cNvSpPr/>
-          <p:nvPr/>
-        </p:nvSpPr>
-        <p:spPr>
-          <a:xfrm>
-            <a:off x="1719072" y="3880032"/>
+            <a:off x="332459" y="3063168"/>
             <a:ext cx="1139952" cy="420624"/>
           </a:xfrm>
           <a:prstGeom prst="ellipse">
@@ -3716,14 +4506,7 @@
           <a:p>
             <a:pPr algn="ctr"/>
             <a:r>
-              <a:rPr lang="en-US" sz="1400" dirty="0"/>
-              <a:t>web app</a:t>
-            </a:r>
-          </a:p>
-          <a:p>
-            <a:pPr algn="ctr"/>
-            <a:r>
-              <a:rPr lang="en-US" sz="1400" dirty="0"/>
+              <a:rPr lang="en-US" sz="1400" b="1" dirty="0"/>
               <a:t>link</a:t>
             </a:r>
           </a:p>
@@ -3731,10 +4514,10 @@
       </p:sp>
       <p:sp>
         <p:nvSpPr>
-          <p:cNvPr id="8" name="Rectangle: Rounded Corners 7">
-            <a:extLst>
-              <a:ext uri="{FF2B5EF4-FFF2-40B4-BE49-F238E27FC236}">
-                <a16:creationId xmlns:a16="http://schemas.microsoft.com/office/drawing/2014/main" id="{A3946FBF-CD60-45BC-9EEE-0FCD70BE394F}"/>
+          <p:cNvPr id="48" name="Rectangle: Rounded Corners 47">
+            <a:extLst>
+              <a:ext uri="{FF2B5EF4-FFF2-40B4-BE49-F238E27FC236}">
+                <a16:creationId xmlns:a16="http://schemas.microsoft.com/office/drawing/2014/main" id="{FA0A4839-C460-4BF0-9D7B-E9FFFC04B2A0}"/>
               </a:ext>
             </a:extLst>
           </p:cNvPr>
@@ -3743,7 +4526,7 @@
         </p:nvSpPr>
         <p:spPr>
           <a:xfrm>
-            <a:off x="3200400" y="2154418"/>
+            <a:off x="1880843" y="481584"/>
             <a:ext cx="1018032" cy="445008"/>
           </a:xfrm>
           <a:prstGeom prst="roundRect">
@@ -3772,14 +4555,14 @@
           <a:p>
             <a:pPr algn="ctr"/>
             <a:r>
-              <a:rPr lang="en-US" sz="1400" dirty="0"/>
+              <a:rPr lang="en-US" sz="1200" b="1" dirty="0"/>
               <a:t>Final</a:t>
             </a:r>
           </a:p>
           <a:p>
             <a:pPr algn="ctr"/>
             <a:r>
-              <a:rPr lang="en-US" sz="1400" dirty="0"/>
+              <a:rPr lang="en-US" sz="1200" b="1" dirty="0"/>
               <a:t>Executable</a:t>
             </a:r>
           </a:p>
@@ -3787,10 +4570,10 @@
       </p:sp>
       <p:cxnSp>
         <p:nvCxnSpPr>
-          <p:cNvPr id="11" name="Straight Arrow Connector 10">
-            <a:extLst>
-              <a:ext uri="{FF2B5EF4-FFF2-40B4-BE49-F238E27FC236}">
-                <a16:creationId xmlns:a16="http://schemas.microsoft.com/office/drawing/2014/main" id="{804910A7-5F66-4F32-BD34-2CA1FF6214C6}"/>
+          <p:cNvPr id="49" name="Straight Arrow Connector 48">
+            <a:extLst>
+              <a:ext uri="{FF2B5EF4-FFF2-40B4-BE49-F238E27FC236}">
+                <a16:creationId xmlns:a16="http://schemas.microsoft.com/office/drawing/2014/main" id="{8911EDF0-15FC-4E31-A276-A51A97F4D254}"/>
               </a:ext>
             </a:extLst>
           </p:cNvPr>
@@ -3799,7 +4582,7 @@
         </p:nvCxnSpPr>
         <p:spPr>
           <a:xfrm>
-            <a:off x="2289048" y="2584632"/>
+            <a:off x="902435" y="931093"/>
             <a:ext cx="0" cy="140208"/>
           </a:xfrm>
           <a:prstGeom prst="straightConnector1">
@@ -3826,10 +4609,10 @@
       </p:cxnSp>
       <p:cxnSp>
         <p:nvCxnSpPr>
-          <p:cNvPr id="13" name="Straight Arrow Connector 12">
-            <a:extLst>
-              <a:ext uri="{FF2B5EF4-FFF2-40B4-BE49-F238E27FC236}">
-                <a16:creationId xmlns:a16="http://schemas.microsoft.com/office/drawing/2014/main" id="{4D43BCFF-C0C2-4EDA-BF7C-1499D9038BF5}"/>
+          <p:cNvPr id="53" name="Straight Arrow Connector 52">
+            <a:extLst>
+              <a:ext uri="{FF2B5EF4-FFF2-40B4-BE49-F238E27FC236}">
+                <a16:creationId xmlns:a16="http://schemas.microsoft.com/office/drawing/2014/main" id="{7DC9D2ED-B682-401B-81B1-8AF8F39342A4}"/>
               </a:ext>
             </a:extLst>
           </p:cNvPr>
@@ -3839,9 +4622,9 @@
           <p:nvPr/>
         </p:nvCxnSpPr>
         <p:spPr>
-          <a:xfrm>
-            <a:off x="2289048" y="3169848"/>
-            <a:ext cx="0" cy="134112"/>
+          <a:xfrm flipV="1">
+            <a:off x="902435" y="4072056"/>
+            <a:ext cx="0" cy="204216"/>
           </a:xfrm>
           <a:prstGeom prst="straightConnector1">
             <a:avLst/>
@@ -3867,10 +4650,10 @@
       </p:cxnSp>
       <p:cxnSp>
         <p:nvCxnSpPr>
-          <p:cNvPr id="22" name="Straight Arrow Connector 21">
-            <a:extLst>
-              <a:ext uri="{FF2B5EF4-FFF2-40B4-BE49-F238E27FC236}">
-                <a16:creationId xmlns:a16="http://schemas.microsoft.com/office/drawing/2014/main" id="{5A15EF70-57A5-4813-9157-FABDA6D37E83}"/>
+          <p:cNvPr id="54" name="Straight Arrow Connector 53">
+            <a:extLst>
+              <a:ext uri="{FF2B5EF4-FFF2-40B4-BE49-F238E27FC236}">
+                <a16:creationId xmlns:a16="http://schemas.microsoft.com/office/drawing/2014/main" id="{B474B47F-69D9-4327-AA09-BE69AC87896D}"/>
               </a:ext>
             </a:extLst>
           </p:cNvPr>
@@ -3880,9 +4663,9 @@
           <p:nvPr/>
         </p:nvCxnSpPr>
         <p:spPr>
-          <a:xfrm>
-            <a:off x="2289048" y="3748968"/>
-            <a:ext cx="0" cy="131064"/>
+          <a:xfrm flipV="1">
+            <a:off x="902435" y="3483792"/>
+            <a:ext cx="0" cy="143256"/>
           </a:xfrm>
           <a:prstGeom prst="straightConnector1">
             <a:avLst/>
@@ -3906,94 +4689,12 @@
           </a:fontRef>
         </p:style>
       </p:cxnSp>
-      <p:cxnSp>
-        <p:nvCxnSpPr>
-          <p:cNvPr id="25" name="Straight Arrow Connector 24">
-            <a:extLst>
-              <a:ext uri="{FF2B5EF4-FFF2-40B4-BE49-F238E27FC236}">
-                <a16:creationId xmlns:a16="http://schemas.microsoft.com/office/drawing/2014/main" id="{DF2DBE3E-9A19-4A2C-97C6-265868FEA8E9}"/>
-              </a:ext>
-            </a:extLst>
-          </p:cNvPr>
-          <p:cNvCxnSpPr>
-            <a:cxnSpLocks/>
-          </p:cNvCxnSpPr>
-          <p:nvPr/>
-        </p:nvCxnSpPr>
-        <p:spPr>
-          <a:xfrm flipV="1">
-            <a:off x="2289048" y="4888920"/>
-            <a:ext cx="0" cy="204216"/>
-          </a:xfrm>
-          <a:prstGeom prst="straightConnector1">
-            <a:avLst/>
-          </a:prstGeom>
-          <a:ln w="28575">
-            <a:tailEnd type="triangle"/>
-          </a:ln>
-        </p:spPr>
-        <p:style>
-          <a:lnRef idx="1">
-            <a:schemeClr val="accent1"/>
-          </a:lnRef>
-          <a:fillRef idx="0">
-            <a:schemeClr val="accent1"/>
-          </a:fillRef>
-          <a:effectRef idx="0">
-            <a:schemeClr val="accent1"/>
-          </a:effectRef>
-          <a:fontRef idx="minor">
-            <a:schemeClr val="tx1"/>
-          </a:fontRef>
-        </p:style>
-      </p:cxnSp>
-      <p:cxnSp>
-        <p:nvCxnSpPr>
-          <p:cNvPr id="28" name="Straight Arrow Connector 27">
-            <a:extLst>
-              <a:ext uri="{FF2B5EF4-FFF2-40B4-BE49-F238E27FC236}">
-                <a16:creationId xmlns:a16="http://schemas.microsoft.com/office/drawing/2014/main" id="{3F9C5852-C102-41BC-8C8F-5581198C54F3}"/>
-              </a:ext>
-            </a:extLst>
-          </p:cNvPr>
-          <p:cNvCxnSpPr>
-            <a:cxnSpLocks/>
-          </p:cNvCxnSpPr>
-          <p:nvPr/>
-        </p:nvCxnSpPr>
-        <p:spPr>
-          <a:xfrm flipV="1">
-            <a:off x="2289048" y="4300656"/>
-            <a:ext cx="0" cy="143256"/>
-          </a:xfrm>
-          <a:prstGeom prst="straightConnector1">
-            <a:avLst/>
-          </a:prstGeom>
-          <a:ln w="28575">
-            <a:tailEnd type="triangle"/>
-          </a:ln>
-        </p:spPr>
-        <p:style>
-          <a:lnRef idx="1">
-            <a:schemeClr val="accent1"/>
-          </a:lnRef>
-          <a:fillRef idx="0">
-            <a:schemeClr val="accent1"/>
-          </a:fillRef>
-          <a:effectRef idx="0">
-            <a:schemeClr val="accent1"/>
-          </a:effectRef>
-          <a:fontRef idx="minor">
-            <a:schemeClr val="tx1"/>
-          </a:fontRef>
-        </p:style>
-      </p:cxnSp>
-      <p:sp>
-        <p:nvSpPr>
-          <p:cNvPr id="38" name="Right Brace 37">
-            <a:extLst>
-              <a:ext uri="{FF2B5EF4-FFF2-40B4-BE49-F238E27FC236}">
-                <a16:creationId xmlns:a16="http://schemas.microsoft.com/office/drawing/2014/main" id="{B7F1C21F-95DB-4E5A-9ABE-E0FA4DFB428D}"/>
+      <p:sp>
+        <p:nvSpPr>
+          <p:cNvPr id="57" name="Right Brace 56">
+            <a:extLst>
+              <a:ext uri="{FF2B5EF4-FFF2-40B4-BE49-F238E27FC236}">
+                <a16:creationId xmlns:a16="http://schemas.microsoft.com/office/drawing/2014/main" id="{2D9DB96C-AF84-47F5-AAB1-DF3CD053D64A}"/>
               </a:ext>
             </a:extLst>
           </p:cNvPr>
@@ -4002,7 +4703,7 @@
         </p:nvSpPr>
         <p:spPr>
           <a:xfrm>
-            <a:off x="3140962" y="4690728"/>
+            <a:off x="1775458" y="3818554"/>
             <a:ext cx="187453" cy="653832"/>
           </a:xfrm>
           <a:prstGeom prst="rightBrace">
@@ -4032,16 +4733,16 @@
           <a:lstStyle/>
           <a:p>
             <a:pPr algn="ctr"/>
-            <a:endParaRPr lang="en-US"/>
-          </a:p>
-        </p:txBody>
-      </p:sp>
-      <p:sp>
-        <p:nvSpPr>
-          <p:cNvPr id="39" name="TextBox 38">
-            <a:extLst>
-              <a:ext uri="{FF2B5EF4-FFF2-40B4-BE49-F238E27FC236}">
-                <a16:creationId xmlns:a16="http://schemas.microsoft.com/office/drawing/2014/main" id="{36493342-CC99-4F2D-B04B-AB5ACFD289F8}"/>
+            <a:endParaRPr lang="en-US" b="1"/>
+          </a:p>
+        </p:txBody>
+      </p:sp>
+      <p:sp>
+        <p:nvSpPr>
+          <p:cNvPr id="58" name="TextBox 57">
+            <a:extLst>
+              <a:ext uri="{FF2B5EF4-FFF2-40B4-BE49-F238E27FC236}">
+                <a16:creationId xmlns:a16="http://schemas.microsoft.com/office/drawing/2014/main" id="{2136FA0F-FD86-4467-8AFD-1932658519E2}"/>
               </a:ext>
             </a:extLst>
           </p:cNvPr>
@@ -4050,8 +4751,8 @@
         </p:nvSpPr>
         <p:spPr>
           <a:xfrm>
-            <a:off x="3476287" y="4635412"/>
-            <a:ext cx="763479" cy="738664"/>
+            <a:off x="2089449" y="3920246"/>
+            <a:ext cx="776879" cy="523220"/>
           </a:xfrm>
           <a:prstGeom prst="rect">
             <a:avLst/>
@@ -4065,19 +4766,13 @@
           <a:lstStyle/>
           <a:p>
             <a:r>
-              <a:rPr lang="en-US" sz="1400" dirty="0"/>
+              <a:rPr lang="en-US" sz="1400" b="1" dirty="0"/>
               <a:t>a priori</a:t>
             </a:r>
           </a:p>
           <a:p>
             <a:r>
-              <a:rPr lang="en-US" sz="1400" dirty="0"/>
-              <a:t>cloud</a:t>
-            </a:r>
-          </a:p>
-          <a:p>
-            <a:r>
-              <a:rPr lang="en-US" sz="1400" dirty="0"/>
+              <a:rPr lang="en-US" sz="1400" b="1" dirty="0"/>
               <a:t>compile</a:t>
             </a:r>
           </a:p>
@@ -4085,10 +4780,10 @@
       </p:sp>
       <p:sp>
         <p:nvSpPr>
-          <p:cNvPr id="40" name="TextBox 39">
-            <a:extLst>
-              <a:ext uri="{FF2B5EF4-FFF2-40B4-BE49-F238E27FC236}">
-                <a16:creationId xmlns:a16="http://schemas.microsoft.com/office/drawing/2014/main" id="{10121E58-91F7-44E0-BEBE-FD88F0AABD39}"/>
+          <p:cNvPr id="59" name="TextBox 58">
+            <a:extLst>
+              <a:ext uri="{FF2B5EF4-FFF2-40B4-BE49-F238E27FC236}">
+                <a16:creationId xmlns:a16="http://schemas.microsoft.com/office/drawing/2014/main" id="{043CB0A6-C155-4A91-B0A5-B7A4BBBA8D10}"/>
               </a:ext>
             </a:extLst>
           </p:cNvPr>
@@ -4097,8 +4792,8 @@
         </p:nvSpPr>
         <p:spPr>
           <a:xfrm>
-            <a:off x="1508143" y="1755612"/>
-            <a:ext cx="1632819" cy="307777"/>
+            <a:off x="517823" y="83750"/>
+            <a:ext cx="822854" cy="307777"/>
           </a:xfrm>
           <a:prstGeom prst="rect">
             <a:avLst/>
@@ -4112,18 +4807,18 @@
           <a:lstStyle/>
           <a:p>
             <a:r>
-              <a:rPr lang="en-US" sz="1400" dirty="0"/>
-              <a:t>MakeCode web app</a:t>
-            </a:r>
-          </a:p>
-        </p:txBody>
-      </p:sp>
-      <p:sp>
-        <p:nvSpPr>
-          <p:cNvPr id="41" name="Rectangle 40">
-            <a:extLst>
-              <a:ext uri="{FF2B5EF4-FFF2-40B4-BE49-F238E27FC236}">
-                <a16:creationId xmlns:a16="http://schemas.microsoft.com/office/drawing/2014/main" id="{394408B5-1179-4E9C-AF56-0891872F5F47}"/>
+              <a:rPr lang="en-US" sz="1400" b="1" dirty="0"/>
+              <a:t>web app</a:t>
+            </a:r>
+          </a:p>
+        </p:txBody>
+      </p:sp>
+      <p:sp>
+        <p:nvSpPr>
+          <p:cNvPr id="69" name="Rectangle: Rounded Corners 68">
+            <a:extLst>
+              <a:ext uri="{FF2B5EF4-FFF2-40B4-BE49-F238E27FC236}">
+                <a16:creationId xmlns:a16="http://schemas.microsoft.com/office/drawing/2014/main" id="{B398091D-E7AE-4190-90AF-5872A3F423DD}"/>
               </a:ext>
             </a:extLst>
           </p:cNvPr>
@@ -4132,53 +4827,7 @@
         </p:nvSpPr>
         <p:spPr>
           <a:xfrm>
-            <a:off x="6696456" y="1784533"/>
-            <a:ext cx="1487424" cy="1182696"/>
-          </a:xfrm>
-          <a:prstGeom prst="rect">
-            <a:avLst/>
-          </a:prstGeom>
-        </p:spPr>
-        <p:style>
-          <a:lnRef idx="2">
-            <a:schemeClr val="accent3">
-              <a:shade val="50000"/>
-            </a:schemeClr>
-          </a:lnRef>
-          <a:fillRef idx="1">
-            <a:schemeClr val="accent3"/>
-          </a:fillRef>
-          <a:effectRef idx="0">
-            <a:schemeClr val="accent3"/>
-          </a:effectRef>
-          <a:fontRef idx="minor">
-            <a:schemeClr val="lt1"/>
-          </a:fontRef>
-        </p:style>
-        <p:txBody>
-          <a:bodyPr rtlCol="0" anchor="ctr"/>
-          <a:lstStyle/>
-          <a:p>
-            <a:pPr algn="ctr"/>
-            <a:endParaRPr lang="en-US"/>
-          </a:p>
-        </p:txBody>
-      </p:sp>
-      <p:sp>
-        <p:nvSpPr>
-          <p:cNvPr id="42" name="Rectangle: Rounded Corners 41">
-            <a:extLst>
-              <a:ext uri="{FF2B5EF4-FFF2-40B4-BE49-F238E27FC236}">
-                <a16:creationId xmlns:a16="http://schemas.microsoft.com/office/drawing/2014/main" id="{C89350E1-E03D-45A0-9496-67EFA3B1A97F}"/>
-              </a:ext>
-            </a:extLst>
-          </p:cNvPr>
-          <p:cNvSpPr/>
-          <p:nvPr/>
-        </p:nvSpPr>
-        <p:spPr>
-          <a:xfrm>
-            <a:off x="6757643" y="1863781"/>
+            <a:off x="241019" y="1895784"/>
             <a:ext cx="1322832" cy="445008"/>
           </a:xfrm>
           <a:prstGeom prst="roundRect">
@@ -4207,19 +4856,25 @@
           <a:p>
             <a:pPr algn="ctr"/>
             <a:r>
-              <a:rPr lang="en-US" sz="1400" dirty="0" err="1"/>
-              <a:t>Blockly</a:t>
-            </a:r>
-            <a:endParaRPr lang="en-US" sz="1400" dirty="0"/>
-          </a:p>
-        </p:txBody>
-      </p:sp>
-      <p:sp>
-        <p:nvSpPr>
-          <p:cNvPr id="43" name="Rectangle: Rounded Corners 42">
-            <a:extLst>
-              <a:ext uri="{FF2B5EF4-FFF2-40B4-BE49-F238E27FC236}">
-                <a16:creationId xmlns:a16="http://schemas.microsoft.com/office/drawing/2014/main" id="{CF5B4151-D2C6-442E-BF94-B7DA552439E2}"/>
+              <a:rPr lang="en-US" sz="1400" b="1" dirty="0"/>
+              <a:t>User</a:t>
+            </a:r>
+          </a:p>
+          <a:p>
+            <a:pPr algn="ctr"/>
+            <a:r>
+              <a:rPr lang="en-US" sz="1400" b="1" dirty="0"/>
+              <a:t>Program text</a:t>
+            </a:r>
+          </a:p>
+        </p:txBody>
+      </p:sp>
+      <p:sp>
+        <p:nvSpPr>
+          <p:cNvPr id="70" name="Rectangle: Rounded Corners 69">
+            <a:extLst>
+              <a:ext uri="{FF2B5EF4-FFF2-40B4-BE49-F238E27FC236}">
+                <a16:creationId xmlns:a16="http://schemas.microsoft.com/office/drawing/2014/main" id="{E76E753A-7416-4E05-AB12-419E2A169F35}"/>
               </a:ext>
             </a:extLst>
           </p:cNvPr>
@@ -4228,63 +4883,7 @@
         </p:nvSpPr>
         <p:spPr>
           <a:xfrm>
-            <a:off x="6757643" y="2448997"/>
-            <a:ext cx="1322832" cy="445008"/>
-          </a:xfrm>
-          <a:prstGeom prst="roundRect">
-            <a:avLst/>
-          </a:prstGeom>
-        </p:spPr>
-        <p:style>
-          <a:lnRef idx="2">
-            <a:schemeClr val="accent2">
-              <a:shade val="50000"/>
-            </a:schemeClr>
-          </a:lnRef>
-          <a:fillRef idx="1">
-            <a:schemeClr val="accent2"/>
-          </a:fillRef>
-          <a:effectRef idx="0">
-            <a:schemeClr val="accent2"/>
-          </a:effectRef>
-          <a:fontRef idx="minor">
-            <a:schemeClr val="lt1"/>
-          </a:fontRef>
-        </p:style>
-        <p:txBody>
-          <a:bodyPr rtlCol="0" anchor="ctr"/>
-          <a:lstStyle/>
-          <a:p>
-            <a:pPr algn="ctr"/>
-            <a:r>
-              <a:rPr lang="en-US" sz="1400" dirty="0"/>
-              <a:t>User</a:t>
-            </a:r>
-          </a:p>
-          <a:p>
-            <a:pPr algn="ctr"/>
-            <a:r>
-              <a:rPr lang="en-US" sz="1400" dirty="0"/>
-              <a:t>Program text</a:t>
-            </a:r>
-          </a:p>
-        </p:txBody>
-      </p:sp>
-      <p:sp>
-        <p:nvSpPr>
-          <p:cNvPr id="45" name="Rectangle: Rounded Corners 44">
-            <a:extLst>
-              <a:ext uri="{FF2B5EF4-FFF2-40B4-BE49-F238E27FC236}">
-                <a16:creationId xmlns:a16="http://schemas.microsoft.com/office/drawing/2014/main" id="{978CC538-ADCD-4ACB-94E5-C993855873C5}"/>
-              </a:ext>
-            </a:extLst>
-          </p:cNvPr>
-          <p:cNvSpPr/>
-          <p:nvPr/>
-        </p:nvSpPr>
-        <p:spPr>
-          <a:xfrm>
-            <a:off x="6757643" y="5004744"/>
+            <a:off x="241019" y="2474904"/>
             <a:ext cx="1322832" cy="445008"/>
           </a:xfrm>
           <a:prstGeom prst="roundRect">
@@ -4313,218 +4912,25 @@
           <a:p>
             <a:pPr algn="ctr"/>
             <a:r>
-              <a:rPr lang="en-US" sz="1400" dirty="0"/>
-              <a:t>Runtime</a:t>
+              <a:rPr lang="en-US" sz="1400" b="1" dirty="0"/>
+              <a:t>User</a:t>
             </a:r>
           </a:p>
           <a:p>
             <a:pPr algn="ctr"/>
             <a:r>
-              <a:rPr lang="en-US" sz="1400" dirty="0"/>
+              <a:rPr lang="en-US" sz="1400" b="1" dirty="0"/>
               <a:t>Machine Code</a:t>
-            </a:r>
-          </a:p>
-        </p:txBody>
-      </p:sp>
-      <p:sp>
-        <p:nvSpPr>
-          <p:cNvPr id="46" name="Rectangle: Rounded Corners 45">
-            <a:extLst>
-              <a:ext uri="{FF2B5EF4-FFF2-40B4-BE49-F238E27FC236}">
-                <a16:creationId xmlns:a16="http://schemas.microsoft.com/office/drawing/2014/main" id="{2C90ADC8-D39D-4A4C-91B6-736F5A3513C3}"/>
-              </a:ext>
-            </a:extLst>
-          </p:cNvPr>
-          <p:cNvSpPr/>
-          <p:nvPr/>
-        </p:nvSpPr>
-        <p:spPr>
-          <a:xfrm>
-            <a:off x="6757643" y="5653968"/>
-            <a:ext cx="1322832" cy="445008"/>
-          </a:xfrm>
-          <a:prstGeom prst="roundRect">
-            <a:avLst/>
-          </a:prstGeom>
-        </p:spPr>
-        <p:style>
-          <a:lnRef idx="2">
-            <a:schemeClr val="accent1">
-              <a:shade val="50000"/>
-            </a:schemeClr>
-          </a:lnRef>
-          <a:fillRef idx="1">
-            <a:schemeClr val="accent1"/>
-          </a:fillRef>
-          <a:effectRef idx="0">
-            <a:schemeClr val="accent1"/>
-          </a:effectRef>
-          <a:fontRef idx="minor">
-            <a:schemeClr val="lt1"/>
-          </a:fontRef>
-        </p:style>
-        <p:txBody>
-          <a:bodyPr rtlCol="0" anchor="ctr"/>
-          <a:lstStyle/>
-          <a:p>
-            <a:pPr algn="ctr"/>
-            <a:r>
-              <a:rPr lang="en-US" sz="1400" dirty="0"/>
-              <a:t>C++ runtime</a:t>
-            </a:r>
-          </a:p>
-        </p:txBody>
-      </p:sp>
-      <p:sp>
-        <p:nvSpPr>
-          <p:cNvPr id="47" name="Oval 46">
-            <a:extLst>
-              <a:ext uri="{FF2B5EF4-FFF2-40B4-BE49-F238E27FC236}">
-                <a16:creationId xmlns:a16="http://schemas.microsoft.com/office/drawing/2014/main" id="{79A22718-7C32-4C8E-81C0-E2DE87F3DE6E}"/>
-              </a:ext>
-            </a:extLst>
-          </p:cNvPr>
-          <p:cNvSpPr/>
-          <p:nvPr/>
-        </p:nvSpPr>
-        <p:spPr>
-          <a:xfrm>
-            <a:off x="6849083" y="4440864"/>
-            <a:ext cx="1139952" cy="420624"/>
-          </a:xfrm>
-          <a:prstGeom prst="ellipse">
-            <a:avLst/>
-          </a:prstGeom>
-        </p:spPr>
-        <p:style>
-          <a:lnRef idx="2">
-            <a:schemeClr val="accent6">
-              <a:shade val="50000"/>
-            </a:schemeClr>
-          </a:lnRef>
-          <a:fillRef idx="1">
-            <a:schemeClr val="accent6"/>
-          </a:fillRef>
-          <a:effectRef idx="0">
-            <a:schemeClr val="accent6"/>
-          </a:effectRef>
-          <a:fontRef idx="minor">
-            <a:schemeClr val="lt1"/>
-          </a:fontRef>
-        </p:style>
-        <p:txBody>
-          <a:bodyPr rtlCol="0" anchor="ctr"/>
-          <a:lstStyle/>
-          <a:p>
-            <a:pPr algn="ctr"/>
-            <a:r>
-              <a:rPr lang="en-US" sz="1400" dirty="0"/>
-              <a:t>cloud link</a:t>
-            </a:r>
-          </a:p>
-        </p:txBody>
-      </p:sp>
-      <p:sp>
-        <p:nvSpPr>
-          <p:cNvPr id="48" name="Rectangle: Rounded Corners 47">
-            <a:extLst>
-              <a:ext uri="{FF2B5EF4-FFF2-40B4-BE49-F238E27FC236}">
-                <a16:creationId xmlns:a16="http://schemas.microsoft.com/office/drawing/2014/main" id="{FA0A4839-C460-4BF0-9D7B-E9FFFC04B2A0}"/>
-              </a:ext>
-            </a:extLst>
-          </p:cNvPr>
-          <p:cNvSpPr/>
-          <p:nvPr/>
-        </p:nvSpPr>
-        <p:spPr>
-          <a:xfrm>
-            <a:off x="8397467" y="1859280"/>
-            <a:ext cx="1018032" cy="445008"/>
-          </a:xfrm>
-          <a:prstGeom prst="roundRect">
-            <a:avLst/>
-          </a:prstGeom>
-        </p:spPr>
-        <p:style>
-          <a:lnRef idx="2">
-            <a:schemeClr val="accent1">
-              <a:shade val="50000"/>
-            </a:schemeClr>
-          </a:lnRef>
-          <a:fillRef idx="1">
-            <a:schemeClr val="accent1"/>
-          </a:fillRef>
-          <a:effectRef idx="0">
-            <a:schemeClr val="accent1"/>
-          </a:effectRef>
-          <a:fontRef idx="minor">
-            <a:schemeClr val="lt1"/>
-          </a:fontRef>
-        </p:style>
-        <p:txBody>
-          <a:bodyPr rtlCol="0" anchor="ctr"/>
-          <a:lstStyle/>
-          <a:p>
-            <a:pPr algn="ctr"/>
-            <a:r>
-              <a:rPr lang="en-US" sz="1400" dirty="0"/>
-              <a:t>Final</a:t>
-            </a:r>
-          </a:p>
-          <a:p>
-            <a:pPr algn="ctr"/>
-            <a:r>
-              <a:rPr lang="en-US" sz="1400" dirty="0"/>
-              <a:t>Executable</a:t>
             </a:r>
           </a:p>
         </p:txBody>
       </p:sp>
       <p:cxnSp>
         <p:nvCxnSpPr>
-          <p:cNvPr id="49" name="Straight Arrow Connector 48">
-            <a:extLst>
-              <a:ext uri="{FF2B5EF4-FFF2-40B4-BE49-F238E27FC236}">
-                <a16:creationId xmlns:a16="http://schemas.microsoft.com/office/drawing/2014/main" id="{8911EDF0-15FC-4E31-A276-A51A97F4D254}"/>
-              </a:ext>
-            </a:extLst>
-          </p:cNvPr>
-          <p:cNvCxnSpPr/>
-          <p:nvPr/>
-        </p:nvCxnSpPr>
-        <p:spPr>
-          <a:xfrm>
-            <a:off x="7419059" y="2308789"/>
-            <a:ext cx="0" cy="140208"/>
-          </a:xfrm>
-          <a:prstGeom prst="straightConnector1">
-            <a:avLst/>
-          </a:prstGeom>
-          <a:ln w="28575">
-            <a:tailEnd type="triangle"/>
-          </a:ln>
-        </p:spPr>
-        <p:style>
-          <a:lnRef idx="1">
-            <a:schemeClr val="accent1"/>
-          </a:lnRef>
-          <a:fillRef idx="0">
-            <a:schemeClr val="accent1"/>
-          </a:fillRef>
-          <a:effectRef idx="0">
-            <a:schemeClr val="accent1"/>
-          </a:effectRef>
-          <a:fontRef idx="minor">
-            <a:schemeClr val="tx1"/>
-          </a:fontRef>
-        </p:style>
-      </p:cxnSp>
-      <p:cxnSp>
-        <p:nvCxnSpPr>
-          <p:cNvPr id="53" name="Straight Arrow Connector 52">
-            <a:extLst>
-              <a:ext uri="{FF2B5EF4-FFF2-40B4-BE49-F238E27FC236}">
-                <a16:creationId xmlns:a16="http://schemas.microsoft.com/office/drawing/2014/main" id="{7DC9D2ED-B682-401B-81B1-8AF8F39342A4}"/>
+          <p:cNvPr id="71" name="Straight Arrow Connector 70">
+            <a:extLst>
+              <a:ext uri="{FF2B5EF4-FFF2-40B4-BE49-F238E27FC236}">
+                <a16:creationId xmlns:a16="http://schemas.microsoft.com/office/drawing/2014/main" id="{8F04508C-D89C-4155-B397-FD8D03D5AEB4}"/>
               </a:ext>
             </a:extLst>
           </p:cNvPr>
@@ -4534,326 +4940,8 @@
           <p:nvPr/>
         </p:nvCxnSpPr>
         <p:spPr>
-          <a:xfrm flipV="1">
-            <a:off x="7419059" y="5449752"/>
-            <a:ext cx="0" cy="204216"/>
-          </a:xfrm>
-          <a:prstGeom prst="straightConnector1">
-            <a:avLst/>
-          </a:prstGeom>
-          <a:ln w="28575">
-            <a:tailEnd type="triangle"/>
-          </a:ln>
-        </p:spPr>
-        <p:style>
-          <a:lnRef idx="1">
-            <a:schemeClr val="accent1"/>
-          </a:lnRef>
-          <a:fillRef idx="0">
-            <a:schemeClr val="accent1"/>
-          </a:fillRef>
-          <a:effectRef idx="0">
-            <a:schemeClr val="accent1"/>
-          </a:effectRef>
-          <a:fontRef idx="minor">
-            <a:schemeClr val="tx1"/>
-          </a:fontRef>
-        </p:style>
-      </p:cxnSp>
-      <p:cxnSp>
-        <p:nvCxnSpPr>
-          <p:cNvPr id="54" name="Straight Arrow Connector 53">
-            <a:extLst>
-              <a:ext uri="{FF2B5EF4-FFF2-40B4-BE49-F238E27FC236}">
-                <a16:creationId xmlns:a16="http://schemas.microsoft.com/office/drawing/2014/main" id="{B474B47F-69D9-4327-AA09-BE69AC87896D}"/>
-              </a:ext>
-            </a:extLst>
-          </p:cNvPr>
-          <p:cNvCxnSpPr>
-            <a:cxnSpLocks/>
-          </p:cNvCxnSpPr>
-          <p:nvPr/>
-        </p:nvCxnSpPr>
-        <p:spPr>
-          <a:xfrm flipV="1">
-            <a:off x="7419059" y="4861488"/>
-            <a:ext cx="0" cy="143256"/>
-          </a:xfrm>
-          <a:prstGeom prst="straightConnector1">
-            <a:avLst/>
-          </a:prstGeom>
-          <a:ln w="28575">
-            <a:tailEnd type="triangle"/>
-          </a:ln>
-        </p:spPr>
-        <p:style>
-          <a:lnRef idx="1">
-            <a:schemeClr val="accent1"/>
-          </a:lnRef>
-          <a:fillRef idx="0">
-            <a:schemeClr val="accent1"/>
-          </a:fillRef>
-          <a:effectRef idx="0">
-            <a:schemeClr val="accent1"/>
-          </a:effectRef>
-          <a:fontRef idx="minor">
-            <a:schemeClr val="tx1"/>
-          </a:fontRef>
-        </p:style>
-      </p:cxnSp>
-      <p:sp>
-        <p:nvSpPr>
-          <p:cNvPr id="57" name="Right Brace 56">
-            <a:extLst>
-              <a:ext uri="{FF2B5EF4-FFF2-40B4-BE49-F238E27FC236}">
-                <a16:creationId xmlns:a16="http://schemas.microsoft.com/office/drawing/2014/main" id="{2D9DB96C-AF84-47F5-AAB1-DF3CD053D64A}"/>
-              </a:ext>
-            </a:extLst>
-          </p:cNvPr>
-          <p:cNvSpPr/>
-          <p:nvPr/>
-        </p:nvSpPr>
-        <p:spPr>
-          <a:xfrm>
-            <a:off x="8292082" y="5196250"/>
-            <a:ext cx="187453" cy="653832"/>
-          </a:xfrm>
-          <a:prstGeom prst="rightBrace">
-            <a:avLst>
-              <a:gd name="adj1" fmla="val 138413"/>
-              <a:gd name="adj2" fmla="val 51747"/>
-            </a:avLst>
-          </a:prstGeom>
-          <a:ln w="28575"/>
-        </p:spPr>
-        <p:style>
-          <a:lnRef idx="1">
-            <a:schemeClr val="accent1"/>
-          </a:lnRef>
-          <a:fillRef idx="0">
-            <a:schemeClr val="accent1"/>
-          </a:fillRef>
-          <a:effectRef idx="0">
-            <a:schemeClr val="accent1"/>
-          </a:effectRef>
-          <a:fontRef idx="minor">
-            <a:schemeClr val="tx1"/>
-          </a:fontRef>
-        </p:style>
-        <p:txBody>
-          <a:bodyPr rtlCol="0" anchor="ctr"/>
-          <a:lstStyle/>
-          <a:p>
-            <a:pPr algn="ctr"/>
-            <a:endParaRPr lang="en-US"/>
-          </a:p>
-        </p:txBody>
-      </p:sp>
-      <p:sp>
-        <p:nvSpPr>
-          <p:cNvPr id="58" name="TextBox 57">
-            <a:extLst>
-              <a:ext uri="{FF2B5EF4-FFF2-40B4-BE49-F238E27FC236}">
-                <a16:creationId xmlns:a16="http://schemas.microsoft.com/office/drawing/2014/main" id="{2136FA0F-FD86-4467-8AFD-1932658519E2}"/>
-              </a:ext>
-            </a:extLst>
-          </p:cNvPr>
-          <p:cNvSpPr txBox="1"/>
-          <p:nvPr/>
-        </p:nvSpPr>
-        <p:spPr>
-          <a:xfrm>
-            <a:off x="8606073" y="5297942"/>
-            <a:ext cx="763479" cy="523220"/>
-          </a:xfrm>
-          <a:prstGeom prst="rect">
-            <a:avLst/>
-          </a:prstGeom>
-          <a:noFill/>
-        </p:spPr>
-        <p:txBody>
-          <a:bodyPr wrap="none" rtlCol="0">
-            <a:spAutoFit/>
-          </a:bodyPr>
-          <a:lstStyle/>
-          <a:p>
-            <a:r>
-              <a:rPr lang="en-US" sz="1400" dirty="0"/>
-              <a:t>a priori</a:t>
-            </a:r>
-          </a:p>
-          <a:p>
-            <a:r>
-              <a:rPr lang="en-US" sz="1400" dirty="0"/>
-              <a:t>compile</a:t>
-            </a:r>
-          </a:p>
-        </p:txBody>
-      </p:sp>
-      <p:sp>
-        <p:nvSpPr>
-          <p:cNvPr id="59" name="TextBox 58">
-            <a:extLst>
-              <a:ext uri="{FF2B5EF4-FFF2-40B4-BE49-F238E27FC236}">
-                <a16:creationId xmlns:a16="http://schemas.microsoft.com/office/drawing/2014/main" id="{043CB0A6-C155-4A91-B0A5-B7A4BBBA8D10}"/>
-              </a:ext>
-            </a:extLst>
-          </p:cNvPr>
-          <p:cNvSpPr txBox="1"/>
-          <p:nvPr/>
-        </p:nvSpPr>
-        <p:spPr>
-          <a:xfrm>
-            <a:off x="7034447" y="1461446"/>
-            <a:ext cx="811441" cy="307777"/>
-          </a:xfrm>
-          <a:prstGeom prst="rect">
-            <a:avLst/>
-          </a:prstGeom>
-          <a:noFill/>
-        </p:spPr>
-        <p:txBody>
-          <a:bodyPr wrap="none" rtlCol="0">
-            <a:spAutoFit/>
-          </a:bodyPr>
-          <a:lstStyle/>
-          <a:p>
-            <a:r>
-              <a:rPr lang="en-US" sz="1400" dirty="0"/>
-              <a:t>web app</a:t>
-            </a:r>
-          </a:p>
-        </p:txBody>
-      </p:sp>
-      <p:sp>
-        <p:nvSpPr>
-          <p:cNvPr id="69" name="Rectangle: Rounded Corners 68">
-            <a:extLst>
-              <a:ext uri="{FF2B5EF4-FFF2-40B4-BE49-F238E27FC236}">
-                <a16:creationId xmlns:a16="http://schemas.microsoft.com/office/drawing/2014/main" id="{B398091D-E7AE-4190-90AF-5872A3F423DD}"/>
-              </a:ext>
-            </a:extLst>
-          </p:cNvPr>
-          <p:cNvSpPr/>
-          <p:nvPr/>
-        </p:nvSpPr>
-        <p:spPr>
-          <a:xfrm>
-            <a:off x="6757643" y="3273480"/>
-            <a:ext cx="1322832" cy="445008"/>
-          </a:xfrm>
-          <a:prstGeom prst="roundRect">
-            <a:avLst/>
-          </a:prstGeom>
-        </p:spPr>
-        <p:style>
-          <a:lnRef idx="2">
-            <a:schemeClr val="accent2">
-              <a:shade val="50000"/>
-            </a:schemeClr>
-          </a:lnRef>
-          <a:fillRef idx="1">
-            <a:schemeClr val="accent2"/>
-          </a:fillRef>
-          <a:effectRef idx="0">
-            <a:schemeClr val="accent2"/>
-          </a:effectRef>
-          <a:fontRef idx="minor">
-            <a:schemeClr val="lt1"/>
-          </a:fontRef>
-        </p:style>
-        <p:txBody>
-          <a:bodyPr rtlCol="0" anchor="ctr"/>
-          <a:lstStyle/>
-          <a:p>
-            <a:pPr algn="ctr"/>
-            <a:r>
-              <a:rPr lang="en-US" sz="1400" dirty="0"/>
-              <a:t>User</a:t>
-            </a:r>
-          </a:p>
-          <a:p>
-            <a:pPr algn="ctr"/>
-            <a:r>
-              <a:rPr lang="en-US" sz="1400" dirty="0"/>
-              <a:t>Program text</a:t>
-            </a:r>
-          </a:p>
-        </p:txBody>
-      </p:sp>
-      <p:sp>
-        <p:nvSpPr>
-          <p:cNvPr id="70" name="Rectangle: Rounded Corners 69">
-            <a:extLst>
-              <a:ext uri="{FF2B5EF4-FFF2-40B4-BE49-F238E27FC236}">
-                <a16:creationId xmlns:a16="http://schemas.microsoft.com/office/drawing/2014/main" id="{E76E753A-7416-4E05-AB12-419E2A169F35}"/>
-              </a:ext>
-            </a:extLst>
-          </p:cNvPr>
-          <p:cNvSpPr/>
-          <p:nvPr/>
-        </p:nvSpPr>
-        <p:spPr>
-          <a:xfrm>
-            <a:off x="6757643" y="3852600"/>
-            <a:ext cx="1322832" cy="445008"/>
-          </a:xfrm>
-          <a:prstGeom prst="roundRect">
-            <a:avLst/>
-          </a:prstGeom>
-        </p:spPr>
-        <p:style>
-          <a:lnRef idx="2">
-            <a:schemeClr val="accent1">
-              <a:shade val="50000"/>
-            </a:schemeClr>
-          </a:lnRef>
-          <a:fillRef idx="1">
-            <a:schemeClr val="accent1"/>
-          </a:fillRef>
-          <a:effectRef idx="0">
-            <a:schemeClr val="accent1"/>
-          </a:effectRef>
-          <a:fontRef idx="minor">
-            <a:schemeClr val="lt1"/>
-          </a:fontRef>
-        </p:style>
-        <p:txBody>
-          <a:bodyPr rtlCol="0" anchor="ctr"/>
-          <a:lstStyle/>
-          <a:p>
-            <a:pPr algn="ctr"/>
-            <a:r>
-              <a:rPr lang="en-US" sz="1400" dirty="0"/>
-              <a:t>User</a:t>
-            </a:r>
-          </a:p>
-          <a:p>
-            <a:pPr algn="ctr"/>
-            <a:r>
-              <a:rPr lang="en-US" sz="1400" dirty="0"/>
-              <a:t>Machine Code</a:t>
-            </a:r>
-          </a:p>
-        </p:txBody>
-      </p:sp>
-      <p:cxnSp>
-        <p:nvCxnSpPr>
-          <p:cNvPr id="71" name="Straight Arrow Connector 70">
-            <a:extLst>
-              <a:ext uri="{FF2B5EF4-FFF2-40B4-BE49-F238E27FC236}">
-                <a16:creationId xmlns:a16="http://schemas.microsoft.com/office/drawing/2014/main" id="{8F04508C-D89C-4155-B397-FD8D03D5AEB4}"/>
-              </a:ext>
-            </a:extLst>
-          </p:cNvPr>
-          <p:cNvCxnSpPr>
-            <a:cxnSpLocks/>
-          </p:cNvCxnSpPr>
-          <p:nvPr/>
-        </p:nvCxnSpPr>
-        <p:spPr>
-          <a:xfrm>
-            <a:off x="7419059" y="3718488"/>
+          <a:xfrm>
+            <a:off x="902435" y="2340792"/>
             <a:ext cx="0" cy="134112"/>
           </a:xfrm>
           <a:prstGeom prst="straightConnector1">
@@ -4894,7 +4982,7 @@
         </p:nvCxnSpPr>
         <p:spPr>
           <a:xfrm>
-            <a:off x="7419059" y="4297608"/>
+            <a:off x="902435" y="2919912"/>
             <a:ext cx="0" cy="143256"/>
           </a:xfrm>
           <a:prstGeom prst="straightConnector1">
@@ -4935,7 +5023,7 @@
         </p:nvCxnSpPr>
         <p:spPr>
           <a:xfrm>
-            <a:off x="7419059" y="2894005"/>
+            <a:off x="902435" y="1516309"/>
             <a:ext cx="0" cy="379475"/>
           </a:xfrm>
           <a:prstGeom prst="straightConnector1">
@@ -4978,7 +5066,7 @@
         </p:nvCxnSpPr>
         <p:spPr>
           <a:xfrm flipV="1">
-            <a:off x="7989035" y="2304288"/>
+            <a:off x="1472411" y="926592"/>
             <a:ext cx="917448" cy="2346888"/>
           </a:xfrm>
           <a:prstGeom prst="bentConnector2">
@@ -5003,49 +5091,6 @@
           </a:fontRef>
         </p:style>
       </p:cxnSp>
-      <p:cxnSp>
-        <p:nvCxnSpPr>
-          <p:cNvPr id="84" name="Connector: Elbow 83">
-            <a:extLst>
-              <a:ext uri="{FF2B5EF4-FFF2-40B4-BE49-F238E27FC236}">
-                <a16:creationId xmlns:a16="http://schemas.microsoft.com/office/drawing/2014/main" id="{5036BF24-5A14-4207-8105-6BD37EC6558A}"/>
-              </a:ext>
-            </a:extLst>
-          </p:cNvPr>
-          <p:cNvCxnSpPr>
-            <a:cxnSpLocks/>
-            <a:stCxn id="7" idx="6"/>
-            <a:endCxn id="8" idx="2"/>
-          </p:cNvCxnSpPr>
-          <p:nvPr/>
-        </p:nvCxnSpPr>
-        <p:spPr>
-          <a:xfrm flipV="1">
-            <a:off x="2859024" y="2599426"/>
-            <a:ext cx="850392" cy="1490918"/>
-          </a:xfrm>
-          <a:prstGeom prst="bentConnector2">
-            <a:avLst/>
-          </a:prstGeom>
-          <a:ln w="28575">
-            <a:tailEnd type="triangle"/>
-          </a:ln>
-        </p:spPr>
-        <p:style>
-          <a:lnRef idx="1">
-            <a:schemeClr val="accent1"/>
-          </a:lnRef>
-          <a:fillRef idx="0">
-            <a:schemeClr val="accent1"/>
-          </a:fillRef>
-          <a:effectRef idx="0">
-            <a:schemeClr val="accent1"/>
-          </a:effectRef>
-          <a:fontRef idx="minor">
-            <a:schemeClr val="tx1"/>
-          </a:fontRef>
-        </p:style>
-      </p:cxnSp>
       <p:sp>
         <p:nvSpPr>
           <p:cNvPr id="92" name="TextBox 91">
@@ -5060,8 +5105,8 @@
         </p:nvSpPr>
         <p:spPr>
           <a:xfrm>
-            <a:off x="8141662" y="3146126"/>
-            <a:ext cx="763479" cy="523220"/>
+            <a:off x="1646818" y="2750260"/>
+            <a:ext cx="776879" cy="523220"/>
           </a:xfrm>
           <a:prstGeom prst="rect">
             <a:avLst/>
@@ -5075,13 +5120,13 @@
           <a:lstStyle/>
           <a:p>
             <a:r>
-              <a:rPr lang="en-US" sz="1400" dirty="0"/>
+              <a:rPr lang="en-US" sz="1400" b="1" dirty="0"/>
               <a:t>compile</a:t>
             </a:r>
           </a:p>
           <a:p>
             <a:r>
-              <a:rPr lang="en-US" sz="1400" dirty="0"/>
+              <a:rPr lang="en-US" sz="1400" b="1" dirty="0"/>
               <a:t>service</a:t>
             </a:r>
           </a:p>
@@ -5090,7 +5135,7 @@
     </p:spTree>
     <p:extLst>
       <p:ext uri="{BB962C8B-B14F-4D97-AF65-F5344CB8AC3E}">
-        <p14:creationId xmlns:p14="http://schemas.microsoft.com/office/powerpoint/2010/main" val="3489256861"/>
+        <p14:creationId xmlns:p14="http://schemas.microsoft.com/office/powerpoint/2010/main" val="308528405"/>
       </p:ext>
     </p:extLst>
   </p:cSld>

</xml_diff>